<commit_message>
Added group photo to tri-fold
</commit_message>
<xml_diff>
--- a/Presentation Display/Trifold.pptx
+++ b/Presentation Display/Trifold.pptx
@@ -108,6 +108,22 @@
       </a:defRPr>
     </a:lvl9pPr>
   </p:defaultTextStyle>
+  <p:extLst>
+    <p:ext uri="{EFAFB233-063F-42B5-8137-9DF3F51BA10A}">
+      <p15:sldGuideLst xmlns:p15="http://schemas.microsoft.com/office/powerpoint/2012/main">
+        <p15:guide id="1" orient="horz" pos="2160">
+          <p15:clr>
+            <a:srgbClr val="A4A3A4"/>
+          </p15:clr>
+        </p15:guide>
+        <p15:guide id="2" pos="2880">
+          <p15:clr>
+            <a:srgbClr val="A4A3A4"/>
+          </p15:clr>
+        </p15:guide>
+      </p15:sldGuideLst>
+    </p:ext>
+  </p:extLst>
 </p:presentation>
 </file>
 
@@ -304,7 +320,7 @@
           <a:p>
             <a:fld id="{8011ADEE-8407-4121-A573-57C195DB20DA}" type="datetimeFigureOut">
               <a:rPr lang="en-US" smtClean="0"/>
-              <a:t>4/27/2014</a:t>
+              <a:t>4/30/2014</a:t>
             </a:fld>
             <a:endParaRPr lang="en-US"/>
           </a:p>
@@ -569,7 +585,7 @@
           <a:p>
             <a:fld id="{8011ADEE-8407-4121-A573-57C195DB20DA}" type="datetimeFigureOut">
               <a:rPr lang="en-US" smtClean="0"/>
-              <a:t>4/27/2014</a:t>
+              <a:t>4/30/2014</a:t>
             </a:fld>
             <a:endParaRPr lang="en-US"/>
           </a:p>
@@ -744,7 +760,7 @@
           <a:p>
             <a:fld id="{8011ADEE-8407-4121-A573-57C195DB20DA}" type="datetimeFigureOut">
               <a:rPr lang="en-US" smtClean="0"/>
-              <a:t>4/27/2014</a:t>
+              <a:t>4/30/2014</a:t>
             </a:fld>
             <a:endParaRPr lang="en-US"/>
           </a:p>
@@ -909,7 +925,7 @@
           <a:p>
             <a:fld id="{8011ADEE-8407-4121-A573-57C195DB20DA}" type="datetimeFigureOut">
               <a:rPr lang="en-US" smtClean="0"/>
-              <a:t>4/27/2014</a:t>
+              <a:t>4/30/2014</a:t>
             </a:fld>
             <a:endParaRPr lang="en-US"/>
           </a:p>
@@ -1158,7 +1174,7 @@
           <a:p>
             <a:fld id="{8011ADEE-8407-4121-A573-57C195DB20DA}" type="datetimeFigureOut">
               <a:rPr lang="en-US" smtClean="0"/>
-              <a:t>4/27/2014</a:t>
+              <a:t>4/30/2014</a:t>
             </a:fld>
             <a:endParaRPr lang="en-US"/>
           </a:p>
@@ -1441,7 +1457,7 @@
           <a:p>
             <a:fld id="{8011ADEE-8407-4121-A573-57C195DB20DA}" type="datetimeFigureOut">
               <a:rPr lang="en-US" smtClean="0"/>
-              <a:t>4/27/2014</a:t>
+              <a:t>4/30/2014</a:t>
             </a:fld>
             <a:endParaRPr lang="en-US"/>
           </a:p>
@@ -1880,7 +1896,7 @@
           <a:p>
             <a:fld id="{8011ADEE-8407-4121-A573-57C195DB20DA}" type="datetimeFigureOut">
               <a:rPr lang="en-US" smtClean="0"/>
-              <a:t>4/27/2014</a:t>
+              <a:t>4/30/2014</a:t>
             </a:fld>
             <a:endParaRPr lang="en-US"/>
           </a:p>
@@ -1993,7 +2009,7 @@
           <a:p>
             <a:fld id="{8011ADEE-8407-4121-A573-57C195DB20DA}" type="datetimeFigureOut">
               <a:rPr lang="en-US" smtClean="0"/>
-              <a:t>4/27/2014</a:t>
+              <a:t>4/30/2014</a:t>
             </a:fld>
             <a:endParaRPr lang="en-US"/>
           </a:p>
@@ -2083,7 +2099,7 @@
           <a:p>
             <a:fld id="{8011ADEE-8407-4121-A573-57C195DB20DA}" type="datetimeFigureOut">
               <a:rPr lang="en-US" smtClean="0"/>
-              <a:t>4/27/2014</a:t>
+              <a:t>4/30/2014</a:t>
             </a:fld>
             <a:endParaRPr lang="en-US"/>
           </a:p>
@@ -2325,7 +2341,7 @@
           <a:p>
             <a:fld id="{8011ADEE-8407-4121-A573-57C195DB20DA}" type="datetimeFigureOut">
               <a:rPr lang="en-US" smtClean="0"/>
-              <a:t>4/27/2014</a:t>
+              <a:t>4/30/2014</a:t>
             </a:fld>
             <a:endParaRPr lang="en-US"/>
           </a:p>
@@ -2619,7 +2635,7 @@
           <a:p>
             <a:fld id="{8011ADEE-8407-4121-A573-57C195DB20DA}" type="datetimeFigureOut">
               <a:rPr lang="en-US" smtClean="0"/>
-              <a:t>4/27/2014</a:t>
+              <a:t>4/30/2014</a:t>
             </a:fld>
             <a:endParaRPr lang="en-US"/>
           </a:p>
@@ -2913,7 +2929,7 @@
           <a:p>
             <a:fld id="{8011ADEE-8407-4121-A573-57C195DB20DA}" type="datetimeFigureOut">
               <a:rPr lang="en-US" smtClean="0"/>
-              <a:t>4/27/2014</a:t>
+              <a:t>4/30/2014</a:t>
             </a:fld>
             <a:endParaRPr lang="en-US"/>
           </a:p>
@@ -3483,50 +3499,6 @@
             <a:r>
               <a:rPr lang="en-US" dirty="0" smtClean="0"/>
               <a:t>Printer Pic</a:t>
-            </a:r>
-            <a:endParaRPr lang="en-US" dirty="0"/>
-          </a:p>
-        </p:txBody>
-      </p:sp>
-      <p:sp>
-        <p:nvSpPr>
-          <p:cNvPr id="10" name="Rectangle 9"/>
-          <p:cNvSpPr/>
-          <p:nvPr/>
-        </p:nvSpPr>
-        <p:spPr>
-          <a:xfrm>
-            <a:off x="38100" y="990600"/>
-            <a:ext cx="2112998" cy="1355850"/>
-          </a:xfrm>
-          <a:prstGeom prst="rect">
-            <a:avLst/>
-          </a:prstGeom>
-        </p:spPr>
-        <p:style>
-          <a:lnRef idx="2">
-            <a:schemeClr val="accent1">
-              <a:shade val="50000"/>
-            </a:schemeClr>
-          </a:lnRef>
-          <a:fillRef idx="1">
-            <a:schemeClr val="accent1"/>
-          </a:fillRef>
-          <a:effectRef idx="0">
-            <a:schemeClr val="accent1"/>
-          </a:effectRef>
-          <a:fontRef idx="minor">
-            <a:schemeClr val="lt1"/>
-          </a:fontRef>
-        </p:style>
-        <p:txBody>
-          <a:bodyPr rtlCol="0" anchor="ctr"/>
-          <a:lstStyle/>
-          <a:p>
-            <a:pPr algn="ctr"/>
-            <a:r>
-              <a:rPr lang="en-US" dirty="0" smtClean="0"/>
-              <a:t>Group Photo</a:t>
             </a:r>
             <a:endParaRPr lang="en-US" dirty="0"/>
           </a:p>
@@ -4832,11 +4804,7 @@
           <a:p>
             <a:r>
               <a:rPr lang="en-US" sz="2400" dirty="0" smtClean="0"/>
-              <a:t>Team </a:t>
-            </a:r>
-            <a:r>
-              <a:rPr lang="en-US" sz="2400" dirty="0" smtClean="0"/>
-              <a:t>Ink</a:t>
+              <a:t>Team Ink</a:t>
             </a:r>
             <a:r>
               <a:rPr lang="en-US" sz="2400" dirty="0" smtClean="0">
@@ -4855,11 +4823,7 @@
             </a:br>
             <a:r>
               <a:rPr lang="en-US" sz="1200" dirty="0" smtClean="0"/>
-              <a:t>3D P</a:t>
-            </a:r>
-            <a:r>
-              <a:rPr lang="en-US" sz="1200" dirty="0" smtClean="0"/>
-              <a:t>rinter Fabrication System</a:t>
+              <a:t>3D Printer Fabrication System</a:t>
             </a:r>
             <a:endParaRPr lang="en-US" sz="1200" dirty="0"/>
           </a:p>
@@ -5394,12 +5358,12 @@
           <a:graphicData uri="http://schemas.openxmlformats.org/presentationml/2006/ole">
             <mc:AlternateContent xmlns:mc="http://schemas.openxmlformats.org/markup-compatibility/2006">
               <mc:Choice xmlns:v="urn:schemas-microsoft-com:vml" Requires="v">
-                <p:oleObj spid="_x0000_s1033" name="Visio" r:id="rId8" imgW="7572367" imgH="8496360" progId="Visio.Drawing.15">
+                <p:oleObj spid="_x0000_s1034" name="Visio" r:id="rId9" imgW="7572367" imgH="8496360" progId="Visio.Drawing.15">
                   <p:embed/>
                 </p:oleObj>
               </mc:Choice>
               <mc:Fallback>
-                <p:oleObj name="Visio" r:id="rId8" imgW="7572367" imgH="8496360" progId="Visio.Drawing.15">
+                <p:oleObj name="Visio" r:id="rId9" imgW="7572367" imgH="8496360" progId="Visio.Drawing.15">
                   <p:embed/>
                   <p:pic>
                     <p:nvPicPr>
@@ -5410,7 +5374,7 @@
                       <p:nvPr/>
                     </p:nvPicPr>
                     <p:blipFill>
-                      <a:blip r:embed="rId9">
+                      <a:blip r:embed="rId10">
                         <a:extLst>
                           <a:ext uri="{28A0092B-C50C-407E-A947-70E740481C1C}">
                             <a14:useLocalDpi xmlns:a14="http://schemas.microsoft.com/office/drawing/2010/main" val="0"/>
@@ -6079,6 +6043,36 @@
           </a:graphicData>
         </a:graphic>
       </p:graphicFrame>
+      <p:pic>
+        <p:nvPicPr>
+          <p:cNvPr id="2" name="Picture 1"/>
+          <p:cNvPicPr>
+            <a:picLocks noChangeAspect="1"/>
+          </p:cNvPicPr>
+          <p:nvPr/>
+        </p:nvPicPr>
+        <p:blipFill>
+          <a:blip r:embed="rId11" cstate="print">
+            <a:extLst>
+              <a:ext uri="{28A0092B-C50C-407E-A947-70E740481C1C}">
+                <a14:useLocalDpi xmlns:a14="http://schemas.microsoft.com/office/drawing/2010/main" val="0"/>
+              </a:ext>
+            </a:extLst>
+          </a:blip>
+          <a:stretch>
+            <a:fillRect/>
+          </a:stretch>
+        </p:blipFill>
+        <p:spPr>
+          <a:xfrm>
+            <a:off x="77884" y="987151"/>
+            <a:ext cx="1992925" cy="1494694"/>
+          </a:xfrm>
+          <a:prstGeom prst="rect">
+            <a:avLst/>
+          </a:prstGeom>
+        </p:spPr>
+      </p:pic>
     </p:spTree>
     <p:extLst>
       <p:ext uri="{BB962C8B-B14F-4D97-AF65-F5344CB8AC3E}">

</xml_diff>

<commit_message>
Adjusted dimensions of Trifold
</commit_message>
<xml_diff>
--- a/Presentation Display/Trifold.pptx
+++ b/Presentation Display/Trifold.pptx
@@ -12,7 +12,7 @@
     <p:sldId id="258" r:id="rId6"/>
   </p:sldIdLst>
   <p:sldSz cx="9144000" cy="6858000" type="screen4x3"/>
-  <p:notesSz cx="6858000" cy="9144000"/>
+  <p:notesSz cx="7010400" cy="9296400"/>
   <p:defaultTextStyle>
     <a:defPPr>
       <a:defRPr lang="en-US"/>
@@ -110,7 +110,7 @@
   </p:defaultTextStyle>
   <p:extLst>
     <p:ext uri="{EFAFB233-063F-42B5-8137-9DF3F51BA10A}">
-      <p15:sldGuideLst xmlns:p15="http://schemas.microsoft.com/office/powerpoint/2012/main">
+      <p15:sldGuideLst xmlns:p15="http://schemas.microsoft.com/office/powerpoint/2012/main" xmlns="">
         <p15:guide id="1" orient="horz" pos="2160">
           <p15:clr>
             <a:srgbClr val="A4A3A4"/>
@@ -3422,8 +3422,8 @@
         </p:nvSpPr>
         <p:spPr>
           <a:xfrm>
-            <a:off x="2151097" y="4354091"/>
-            <a:ext cx="2379069" cy="2503909"/>
+            <a:off x="2285999" y="4354091"/>
+            <a:ext cx="2244167" cy="2503909"/>
           </a:xfrm>
           <a:prstGeom prst="rect">
             <a:avLst/>
@@ -3468,7 +3468,7 @@
         </p:nvSpPr>
         <p:spPr>
           <a:xfrm>
-            <a:off x="2819400" y="5606045"/>
+            <a:off x="2819400" y="5745297"/>
             <a:ext cx="1524000" cy="1023355"/>
           </a:xfrm>
           <a:prstGeom prst="rect">
@@ -3512,8 +3512,8 @@
         </p:nvGrpSpPr>
         <p:grpSpPr>
           <a:xfrm>
-            <a:off x="4530167" y="990600"/>
-            <a:ext cx="2379069" cy="3000280"/>
+            <a:off x="4530168" y="990600"/>
+            <a:ext cx="2379068" cy="3000280"/>
             <a:chOff x="4530167" y="990600"/>
             <a:chExt cx="2379069" cy="2961301"/>
           </a:xfrm>
@@ -3701,8 +3701,8 @@
         </p:nvGrpSpPr>
         <p:grpSpPr>
           <a:xfrm>
-            <a:off x="4530166" y="3990880"/>
-            <a:ext cx="2379069" cy="2867120"/>
+            <a:off x="4530167" y="3990880"/>
+            <a:ext cx="2379068" cy="2867120"/>
             <a:chOff x="4530166" y="3990880"/>
             <a:chExt cx="2379069" cy="2867120"/>
           </a:xfrm>
@@ -3891,14 +3891,14 @@
           <p:nvPr>
             <p:extLst>
               <p:ext uri="{D42A27DB-BD31-4B8C-83A1-F6EECF244321}">
-                <p14:modId xmlns:p14="http://schemas.microsoft.com/office/powerpoint/2010/main" val="3698545019"/>
+                <p14:modId xmlns:p14="http://schemas.microsoft.com/office/powerpoint/2010/main" val="2677771258"/>
               </p:ext>
             </p:extLst>
           </p:nvPr>
         </p:nvGraphicFramePr>
         <p:xfrm>
-          <a:off x="50334" y="2471250"/>
-          <a:ext cx="2088530" cy="2278380"/>
+          <a:off x="37594" y="2743199"/>
+          <a:ext cx="2155682" cy="2278380"/>
         </p:xfrm>
         <a:graphic>
           <a:graphicData uri="http://schemas.openxmlformats.org/drawingml/2006/table">
@@ -3907,9 +3907,9 @@
                 <a:tableStyleId>{5C22544A-7EE6-4342-B048-85BDC9FD1C3A}</a:tableStyleId>
               </a:tblPr>
               <a:tblGrid>
-                <a:gridCol w="778244"/>
-                <a:gridCol w="551997"/>
-                <a:gridCol w="758289"/>
+                <a:gridCol w="803267"/>
+                <a:gridCol w="569745"/>
+                <a:gridCol w="782670"/>
               </a:tblGrid>
               <a:tr h="139557">
                 <a:tc>
@@ -4326,12 +4326,12 @@
                         </a:spcAft>
                       </a:pPr>
                       <a:r>
-                        <a:rPr lang="en-US" sz="500">
+                        <a:rPr lang="en-US" sz="500" dirty="0">
                           <a:effectLst/>
                         </a:rPr>
                         <a:t>Software Engineering Lead</a:t>
                       </a:r>
-                      <a:endParaRPr lang="en-US" sz="500">
+                      <a:endParaRPr lang="en-US" sz="500" dirty="0">
                         <a:effectLst/>
                         <a:latin typeface="Times New Roman"/>
                         <a:ea typeface="Times New Roman"/>
@@ -4609,14 +4609,14 @@
           <p:nvPr>
             <p:extLst>
               <p:ext uri="{D42A27DB-BD31-4B8C-83A1-F6EECF244321}">
-                <p14:modId xmlns:p14="http://schemas.microsoft.com/office/powerpoint/2010/main" val="2454828749"/>
+                <p14:modId xmlns:p14="http://schemas.microsoft.com/office/powerpoint/2010/main" val="1588777095"/>
               </p:ext>
             </p:extLst>
           </p:nvPr>
         </p:nvGraphicFramePr>
         <p:xfrm>
-          <a:off x="40106" y="4953000"/>
-          <a:ext cx="2093494" cy="1679136"/>
+          <a:off x="37592" y="5089516"/>
+          <a:ext cx="2172207" cy="1679136"/>
         </p:xfrm>
         <a:graphic>
           <a:graphicData uri="http://schemas.openxmlformats.org/drawingml/2006/table">
@@ -4625,7 +4625,7 @@
                 <a:tableStyleId>{5C22544A-7EE6-4342-B048-85BDC9FD1C3A}</a:tableStyleId>
               </a:tblPr>
               <a:tblGrid>
-                <a:gridCol w="2093494"/>
+                <a:gridCol w="2172207"/>
               </a:tblGrid>
               <a:tr h="164903">
                 <a:tc>
@@ -4837,8 +4837,8 @@
         </p:nvSpPr>
         <p:spPr>
           <a:xfrm>
-            <a:off x="2151098" y="990600"/>
-            <a:ext cx="2379069" cy="1752600"/>
+            <a:off x="2286000" y="990600"/>
+            <a:ext cx="2244167" cy="1752600"/>
           </a:xfrm>
           <a:prstGeom prst="rect">
             <a:avLst/>
@@ -4883,8 +4883,8 @@
         </p:nvSpPr>
         <p:spPr>
           <a:xfrm>
-            <a:off x="2151098" y="990600"/>
-            <a:ext cx="2379069" cy="333402"/>
+            <a:off x="2286000" y="990600"/>
+            <a:ext cx="2244167" cy="333402"/>
           </a:xfrm>
           <a:prstGeom prst="rect">
             <a:avLst/>
@@ -4986,8 +4986,8 @@
         </p:nvSpPr>
         <p:spPr>
           <a:xfrm>
-            <a:off x="2151098" y="2743199"/>
-            <a:ext cx="2379069" cy="1606079"/>
+            <a:off x="2286000" y="2743199"/>
+            <a:ext cx="2244167" cy="1606079"/>
           </a:xfrm>
           <a:prstGeom prst="rect">
             <a:avLst/>
@@ -5032,8 +5032,8 @@
         </p:nvSpPr>
         <p:spPr>
           <a:xfrm>
-            <a:off x="2168055" y="2743200"/>
-            <a:ext cx="2362112" cy="333402"/>
+            <a:off x="2286000" y="2743200"/>
+            <a:ext cx="2244166" cy="333402"/>
           </a:xfrm>
           <a:prstGeom prst="rect">
             <a:avLst/>
@@ -5081,8 +5081,8 @@
         </p:nvSpPr>
         <p:spPr>
           <a:xfrm>
-            <a:off x="2168056" y="3221072"/>
-            <a:ext cx="2362111" cy="1092607"/>
+            <a:off x="2362200" y="3221072"/>
+            <a:ext cx="2167967" cy="1169551"/>
           </a:xfrm>
           <a:prstGeom prst="rect">
             <a:avLst/>
@@ -5152,7 +5152,7 @@
         </p:blipFill>
         <p:spPr bwMode="auto">
           <a:xfrm>
-            <a:off x="2227767" y="4800600"/>
+            <a:off x="2362200" y="4800600"/>
             <a:ext cx="1586605" cy="1083938"/>
           </a:xfrm>
           <a:prstGeom prst="rect">
@@ -5201,8 +5201,8 @@
         </p:nvSpPr>
         <p:spPr>
           <a:xfrm>
-            <a:off x="2151097" y="4354091"/>
-            <a:ext cx="2379069" cy="281906"/>
+            <a:off x="2286000" y="4354091"/>
+            <a:ext cx="2244166" cy="281906"/>
           </a:xfrm>
           <a:prstGeom prst="rect">
             <a:avLst/>
@@ -5358,7 +5358,7 @@
           <a:graphicData uri="http://schemas.openxmlformats.org/presentationml/2006/ole">
             <mc:AlternateContent xmlns:mc="http://schemas.openxmlformats.org/markup-compatibility/2006">
               <mc:Choice xmlns:v="urn:schemas-microsoft-com:vml" Requires="v">
-                <p:oleObj spid="_x0000_s1034" name="Visio" r:id="rId9" imgW="7572367" imgH="8496360" progId="Visio.Drawing.15">
+                <p:oleObj spid="_x0000_s1035" name="Visio" r:id="rId9" imgW="7572367" imgH="8496360" progId="Visio.Drawing.15">
                   <p:embed/>
                 </p:oleObj>
               </mc:Choice>
@@ -6065,8 +6065,8 @@
         </p:blipFill>
         <p:spPr>
           <a:xfrm>
-            <a:off x="77884" y="987151"/>
-            <a:ext cx="1992925" cy="1494694"/>
+            <a:off x="37593" y="1003434"/>
+            <a:ext cx="2134477" cy="1600858"/>
           </a:xfrm>
           <a:prstGeom prst="rect">
             <a:avLst/>

</xml_diff>